<commit_message>
removed data files from repository
</commit_message>
<xml_diff>
--- a/Millennials and Savings.pptx
+++ b/Millennials and Savings.pptx
@@ -798,7 +798,7 @@
             <a:fld id="{5586B75A-687E-405C-8A0B-8D00578BA2C3}" type="datetimeFigureOut">
               <a:rPr lang="en-US" dirty="0"/>
               <a:pPr/>
-              <a:t>4/25/2019</a:t>
+              <a:t>4/26/2019</a:t>
             </a:fld>
             <a:endParaRPr lang="en-US" dirty="0"/>
           </a:p>
@@ -965,7 +965,7 @@
             <a:fld id="{5586B75A-687E-405C-8A0B-8D00578BA2C3}" type="datetimeFigureOut">
               <a:rPr lang="en-US" dirty="0"/>
               <a:pPr/>
-              <a:t>4/25/2019</a:t>
+              <a:t>4/26/2019</a:t>
             </a:fld>
             <a:endParaRPr lang="en-US" dirty="0"/>
           </a:p>
@@ -1142,7 +1142,7 @@
             <a:fld id="{5586B75A-687E-405C-8A0B-8D00578BA2C3}" type="datetimeFigureOut">
               <a:rPr lang="en-US" dirty="0"/>
               <a:pPr/>
-              <a:t>4/25/2019</a:t>
+              <a:t>4/26/2019</a:t>
             </a:fld>
             <a:endParaRPr lang="en-US" dirty="0"/>
           </a:p>
@@ -1309,7 +1309,7 @@
             <a:fld id="{5586B75A-687E-405C-8A0B-8D00578BA2C3}" type="datetimeFigureOut">
               <a:rPr lang="en-US" dirty="0"/>
               <a:pPr/>
-              <a:t>4/25/2019</a:t>
+              <a:t>4/26/2019</a:t>
             </a:fld>
             <a:endParaRPr lang="en-US" dirty="0"/>
           </a:p>
@@ -1564,7 +1564,7 @@
             <a:fld id="{5586B75A-687E-405C-8A0B-8D00578BA2C3}" type="datetimeFigureOut">
               <a:rPr lang="en-US" dirty="0"/>
               <a:pPr/>
-              <a:t>4/25/2019</a:t>
+              <a:t>4/26/2019</a:t>
             </a:fld>
             <a:endParaRPr lang="en-US" dirty="0"/>
           </a:p>
@@ -1849,7 +1849,7 @@
             <a:fld id="{5586B75A-687E-405C-8A0B-8D00578BA2C3}" type="datetimeFigureOut">
               <a:rPr lang="en-US" dirty="0"/>
               <a:pPr/>
-              <a:t>4/25/2019</a:t>
+              <a:t>4/26/2019</a:t>
             </a:fld>
             <a:endParaRPr lang="en-US" dirty="0"/>
           </a:p>
@@ -2288,7 +2288,7 @@
             <a:fld id="{5586B75A-687E-405C-8A0B-8D00578BA2C3}" type="datetimeFigureOut">
               <a:rPr lang="en-US" dirty="0"/>
               <a:pPr/>
-              <a:t>4/25/2019</a:t>
+              <a:t>4/26/2019</a:t>
             </a:fld>
             <a:endParaRPr lang="en-US" dirty="0"/>
           </a:p>
@@ -2403,7 +2403,7 @@
             <a:fld id="{5586B75A-687E-405C-8A0B-8D00578BA2C3}" type="datetimeFigureOut">
               <a:rPr lang="en-US" dirty="0"/>
               <a:pPr/>
-              <a:t>4/25/2019</a:t>
+              <a:t>4/26/2019</a:t>
             </a:fld>
             <a:endParaRPr lang="en-US" dirty="0"/>
           </a:p>
@@ -2495,7 +2495,7 @@
             <a:fld id="{5586B75A-687E-405C-8A0B-8D00578BA2C3}" type="datetimeFigureOut">
               <a:rPr lang="en-US" dirty="0"/>
               <a:pPr/>
-              <a:t>4/25/2019</a:t>
+              <a:t>4/26/2019</a:t>
             </a:fld>
             <a:endParaRPr lang="en-US" dirty="0"/>
           </a:p>
@@ -2780,7 +2780,7 @@
             <a:fld id="{5586B75A-687E-405C-8A0B-8D00578BA2C3}" type="datetimeFigureOut">
               <a:rPr lang="en-US" dirty="0"/>
               <a:pPr/>
-              <a:t>4/25/2019</a:t>
+              <a:t>4/26/2019</a:t>
             </a:fld>
             <a:endParaRPr lang="en-US" dirty="0"/>
           </a:p>
@@ -3050,7 +3050,7 @@
             <a:fld id="{5586B75A-687E-405C-8A0B-8D00578BA2C3}" type="datetimeFigureOut">
               <a:rPr lang="en-US" dirty="0"/>
               <a:pPr/>
-              <a:t>4/25/2019</a:t>
+              <a:t>4/26/2019</a:t>
             </a:fld>
             <a:endParaRPr lang="en-US" dirty="0"/>
           </a:p>
@@ -3344,7 +3344,7 @@
             <a:fld id="{5586B75A-687E-405C-8A0B-8D00578BA2C3}" type="datetimeFigureOut">
               <a:rPr lang="en-US" dirty="0"/>
               <a:pPr/>
-              <a:t>4/25/2019</a:t>
+              <a:t>4/26/2019</a:t>
             </a:fld>
             <a:endParaRPr lang="en-US" dirty="0"/>
           </a:p>
@@ -6977,7 +6977,7 @@
                   <a:schemeClr val="bg1"/>
                 </a:solidFill>
               </a:rPr>
-              <a:t>liquid savings</a:t>
+              <a:t>liquid assets</a:t>
             </a:r>
             <a:r>
               <a:rPr lang="en-US" dirty="0">
@@ -7080,7 +7080,7 @@
         </p:spPr>
         <p:txBody>
           <a:bodyPr vert="horz" lIns="91440" tIns="45720" rIns="91440" bIns="45720" rtlCol="0" anchor="t">
-            <a:normAutofit fontScale="92500" lnSpcReduction="10000"/>
+            <a:normAutofit fontScale="92500"/>
           </a:bodyPr>
           <a:lstStyle>
             <a:lvl1pPr marL="182880" indent="-182880" algn="l" defTabSz="914400" rtl="0" eaLnBrk="1" latinLnBrk="0" hangingPunct="1">
@@ -7338,8 +7338,27 @@
                   </a:schemeClr>
                 </a:solidFill>
               </a:rPr>
-              <a:t>Concerns about expense coverage, achieving long term goals, and savings concerns were lower amongst millennials who reported higher levels of liquid savings</a:t>
-            </a:r>
+              <a:t>Concerns about expense coverage, achieving long term goals, and savings concerns were lower amongst millennials who reported higher levels of </a:t>
+            </a:r>
+            <a:r>
+              <a:rPr lang="en-US">
+                <a:solidFill>
+                  <a:schemeClr val="accent1">
+                    <a:lumMod val="20000"/>
+                    <a:lumOff val="80000"/>
+                  </a:schemeClr>
+                </a:solidFill>
+              </a:rPr>
+              <a:t>liquid assets</a:t>
+            </a:r>
+            <a:endParaRPr lang="en-US" dirty="0">
+              <a:solidFill>
+                <a:schemeClr val="accent1">
+                  <a:lumMod val="20000"/>
+                  <a:lumOff val="80000"/>
+                </a:schemeClr>
+              </a:solidFill>
+            </a:endParaRPr>
           </a:p>
         </p:txBody>
       </p:sp>
@@ -8501,7 +8520,7 @@
                   </a:schemeClr>
                 </a:solidFill>
               </a:rPr>
-              <a:t>People with a bachelor’s degree had more liquid savings than those without*, but they did not have more liquid savings than those with a masters or above.</a:t>
+              <a:t>People with a bachelor’s degree had more liquid assets than those without*, but they did not have more liquid savings than those with a masters or above.</a:t>
             </a:r>
           </a:p>
           <a:p>
@@ -8518,7 +8537,7 @@
                   </a:schemeClr>
                 </a:solidFill>
               </a:rPr>
-              <a:t>*However, are people with more liquid savings more easily able to obtain a bachelors?</a:t>
+              <a:t>*However, are people with more liquid assets more easily able to obtain a bachelors?</a:t>
             </a:r>
           </a:p>
         </p:txBody>

</xml_diff>